<commit_message>
Updated WDS Student Guide and PowerPoint.
</commit_message>
<xml_diff>
--- a/Whiteboard design session/WDS trainer presentation - Migrating Oracle to PostgreSQL.pptx
+++ b/Whiteboard design session/WDS trainer presentation - Migrating Oracle to PostgreSQL.pptx
@@ -226,7 +226,7 @@
           <a:p>
             <a:fld id="{52A13B17-C506-4D51-BB37-16B365906619}" type="datetimeFigureOut">
               <a:rPr lang="en-US" smtClean="0"/>
-              <a:t>8/6/2020</a:t>
+              <a:t>8/19/2021</a:t>
             </a:fld>
             <a:endParaRPr lang="en-US" dirty="0"/>
           </a:p>
@@ -1448,7 +1448,7 @@
                 <a:ea typeface="+mn-ea"/>
                 <a:cs typeface="+mn-cs"/>
               </a:rPr>
-              <a:t>Decided to load schema using ora2pg and data with Azure Database Migration Service</a:t>
+              <a:t>Decided to load schema and data using ora2pg </a:t>
             </a:r>
           </a:p>
           <a:p>
@@ -1541,7 +1541,7 @@
                 <a:ea typeface="+mn-ea"/>
                 <a:cs typeface="+mn-cs"/>
               </a:rPr>
-              <a:t>Azure Database for PostgreSQL - Hyperscale (Citus) </a:t>
+              <a:t>Azure Database for PostgreSQL </a:t>
             </a:r>
             <a:r>
               <a:rPr lang="en-US" sz="1200" b="0" i="0" u="none" strike="noStrike" kern="1200" baseline="0" dirty="0">
@@ -1586,7 +1586,7 @@
                 <a:ea typeface="+mn-ea"/>
                 <a:cs typeface="+mn-cs"/>
               </a:rPr>
-              <a:t>MVC app which changes the connectionString from Oracle to PostgreSQL in Entity Framework (EF)</a:t>
+              <a:t>MVC app which changes the connectionString from Oracle to PostgreSQL in Entity Framework Core (EF Core)</a:t>
             </a:r>
           </a:p>
           <a:p>
@@ -1773,7 +1773,29 @@
                 <a:ea typeface="+mn-ea"/>
                 <a:cs typeface="+mn-cs"/>
               </a:rPr>
-              <a:t>Hyperscale (Citus)</a:t>
+              <a:t>Understanding the use cases of the Azure Database for PostgreSQL Hyperscale (</a:t>
+            </a:r>
+            <a:r>
+              <a:rPr lang="en-US" sz="1200" b="0" i="0" u="none" strike="noStrike" kern="1200" baseline="0" dirty="0" err="1">
+                <a:solidFill>
+                  <a:schemeClr val="tx1"/>
+                </a:solidFill>
+                <a:latin typeface="+mn-lt"/>
+                <a:ea typeface="+mn-ea"/>
+                <a:cs typeface="+mn-cs"/>
+              </a:rPr>
+              <a:t>Citus</a:t>
+            </a:r>
+            <a:r>
+              <a:rPr lang="en-US" sz="1200" b="0" i="0" u="none" strike="noStrike" kern="1200" baseline="0" dirty="0">
+                <a:solidFill>
+                  <a:schemeClr val="tx1"/>
+                </a:solidFill>
+                <a:latin typeface="+mn-lt"/>
+                <a:ea typeface="+mn-ea"/>
+                <a:cs typeface="+mn-cs"/>
+              </a:rPr>
+              <a:t>) offering</a:t>
             </a:r>
           </a:p>
         </p:txBody>
@@ -1903,23 +1925,6 @@
             </a:r>
           </a:p>
           <a:p>
-            <a:pPr marL="628650" lvl="1" indent="-171450" rtl="0">
-              <a:buFont typeface="Arial" panose="020B0604020202020204" pitchFamily="34" charset="0"/>
-              <a:buChar char="•"/>
-            </a:pPr>
-            <a:r>
-              <a:rPr lang="en-US" sz="1200" b="0" i="0" u="none" strike="noStrike" kern="1200" baseline="0" dirty="0">
-                <a:solidFill>
-                  <a:schemeClr val="tx1"/>
-                </a:solidFill>
-                <a:latin typeface="+mn-lt"/>
-                <a:ea typeface="+mn-ea"/>
-                <a:cs typeface="+mn-cs"/>
-              </a:rPr>
-              <a:t>However, ora2pg struggles with online migrations (initial migration + incremental). Therefore, we are using Azure Database Migration Service (DMS) Premium tier to migrate data. Note that DMS can only migrate table schemas, not other objects</a:t>
-            </a:r>
-          </a:p>
-          <a:p>
             <a:pPr marL="457200" lvl="1" indent="0" rtl="0">
               <a:buFont typeface="Arial" panose="020B0604020202020204" pitchFamily="34" charset="0"/>
               <a:buNone/>
@@ -1960,106 +1965,13 @@
                 <a:ea typeface="+mn-ea"/>
                 <a:cs typeface="+mn-cs"/>
               </a:rPr>
-              <a:t>With DMS, you first create a new project. Then you connect to the Oracle source database. Then connect to the PostgreSQL destination database. </a:t>
-            </a:r>
-            <a:r>
-              <a:rPr lang="en-US" sz="1200" b="0" kern="1200" dirty="0">
-                <a:solidFill>
-                  <a:schemeClr val="tx1"/>
-                </a:solidFill>
-                <a:effectLst/>
-                <a:latin typeface="+mn-lt"/>
-                <a:ea typeface="+mn-ea"/>
-                <a:cs typeface="+mn-cs"/>
-              </a:rPr>
-              <a:t>If you choose to create the target tables before using DMS, you will map source tables to target tables. Otherwise, you will simply map the source and target databases. </a:t>
-            </a:r>
-          </a:p>
-          <a:p>
-            <a:pPr marL="171450" marR="0" lvl="0" indent="-171450" algn="l" defTabSz="914400" rtl="0" eaLnBrk="1" fontAlgn="auto" latinLnBrk="0" hangingPunct="1">
-              <a:lnSpc>
-                <a:spcPct val="100000"/>
-              </a:lnSpc>
-              <a:spcBef>
-                <a:spcPts val="0"/>
-              </a:spcBef>
-              <a:spcAft>
-                <a:spcPts val="0"/>
-              </a:spcAft>
-              <a:buClrTx/>
-              <a:buSzTx/>
-              <a:buFont typeface="Arial" panose="020B0604020202020204" pitchFamily="34" charset="0"/>
-              <a:buChar char="•"/>
-              <a:tabLst/>
-              <a:defRPr/>
-            </a:pPr>
+              <a:t>DMS supports online on-premises PostgreSQL to Azure Database for PostgreSQL migrations (uses logical replication for Change Data Capture)</a:t>
+            </a:r>
             <a:endParaRPr lang="en-US" sz="1200" b="0" kern="1200" dirty="0">
               <a:solidFill>
                 <a:schemeClr val="tx1"/>
               </a:solidFill>
               <a:effectLst/>
-              <a:latin typeface="+mn-lt"/>
-              <a:ea typeface="+mn-ea"/>
-              <a:cs typeface="+mn-cs"/>
-            </a:endParaRPr>
-          </a:p>
-          <a:p>
-            <a:pPr marL="171450" marR="0" lvl="0" indent="-171450" algn="l" defTabSz="914400" rtl="0" eaLnBrk="1" fontAlgn="auto" latinLnBrk="0" hangingPunct="1">
-              <a:lnSpc>
-                <a:spcPct val="100000"/>
-              </a:lnSpc>
-              <a:spcBef>
-                <a:spcPts val="0"/>
-              </a:spcBef>
-              <a:spcAft>
-                <a:spcPts val="0"/>
-              </a:spcAft>
-              <a:buClrTx/>
-              <a:buSzTx/>
-              <a:buFont typeface="Arial" panose="020B0604020202020204" pitchFamily="34" charset="0"/>
-              <a:buChar char="•"/>
-              <a:tabLst/>
-              <a:defRPr/>
-            </a:pPr>
-            <a:r>
-              <a:rPr lang="en-US" sz="1200" b="0" i="0" u="none" strike="noStrike" kern="1200" baseline="0" dirty="0">
-                <a:solidFill>
-                  <a:schemeClr val="tx1"/>
-                </a:solidFill>
-                <a:latin typeface="+mn-lt"/>
-                <a:ea typeface="+mn-ea"/>
-                <a:cs typeface="+mn-cs"/>
-              </a:rPr>
-              <a:t>Run the migration. </a:t>
-            </a:r>
-            <a:r>
-              <a:rPr lang="en-US" sz="1200" b="0" i="0" u="none" strike="noStrike" kern="1200" baseline="0" dirty="0">
-                <a:solidFill>
-                  <a:schemeClr val="tx1"/>
-                </a:solidFill>
-                <a:effectLst/>
-                <a:latin typeface="+mn-lt"/>
-                <a:ea typeface="+mn-ea"/>
-                <a:cs typeface="+mn-cs"/>
-              </a:rPr>
-              <a:t>C</a:t>
-            </a:r>
-            <a:r>
-              <a:rPr lang="en-US" sz="1200" b="0" kern="1200" dirty="0">
-                <a:solidFill>
-                  <a:schemeClr val="tx1"/>
-                </a:solidFill>
-                <a:effectLst/>
-                <a:latin typeface="+mn-lt"/>
-                <a:ea typeface="+mn-ea"/>
-                <a:cs typeface="+mn-cs"/>
-              </a:rPr>
-              <a:t>hanges made to the source database during the migration will be applied automatically (incremental data sync)</a:t>
-            </a:r>
-            <a:endParaRPr lang="en-US" sz="1200" b="0" i="0" u="none" strike="noStrike" kern="1200" baseline="0" dirty="0">
-              <a:solidFill>
-                <a:schemeClr val="tx1"/>
-              </a:solidFill>
               <a:latin typeface="+mn-lt"/>
               <a:ea typeface="+mn-ea"/>
               <a:cs typeface="+mn-cs"/>
@@ -2192,7 +2104,7 @@
                 <a:ea typeface="+mn-ea"/>
                 <a:cs typeface="+mn-cs"/>
               </a:rPr>
-              <a:t>A specific product might not be needed, but you might evaluate whether they are using an ORM or not. If they are using Entity Framework, Dapper, or nHibernate, then the application should migrate much more easily.</a:t>
+              <a:t>A specific product might not be needed, but you might evaluate whether they are using an ORM or not. If they are using Entity Framework (Core), Dapper, or nHibernate, then the application should migrate much more easily.</a:t>
             </a:r>
           </a:p>
           <a:p>
@@ -2228,7 +2140,7 @@
                 <a:ea typeface="+mn-ea"/>
                 <a:cs typeface="+mn-cs"/>
               </a:rPr>
-              <a:t>If this code is consolidated, and only plain old CLR objects (POCOs) are being handed back using the repository pattern, then we might be able to replace the entire tier with Entity Framework or another object-relational mapping (ORM) tool</a:t>
+              <a:t>If this code is consolidated, and only plain old CLR objects (POCOs) are being handed back using the repository pattern, then we might be able to replace the entire tier with Entity Framework (Core) or another object-relational mapping (ORM) tool</a:t>
             </a:r>
           </a:p>
           <a:p>
@@ -2516,7 +2428,7 @@
                 <a:ea typeface="+mn-ea"/>
                 <a:cs typeface="+mn-cs"/>
               </a:rPr>
-              <a:t>JSON data can be stored in a JSONB field in PostgreSQL</a:t>
+              <a:t>JSON data can be stored using the JSONB type in PostgreSQL</a:t>
             </a:r>
           </a:p>
           <a:p>
@@ -3022,7 +2934,7 @@
                 <a:ea typeface="+mn-ea"/>
                 <a:cs typeface="+mn-cs"/>
               </a:rPr>
-              <a:t>Azure Database for PostgreSQL can export these files as JSON for storage in Azure Monitor, where they can be analyzed, visualized, and used in more ways</a:t>
+              <a:t>Azure Database for PostgreSQL can export these files as JSON for storage in Azure Monitor, where they can be analyzed and visualized through KQL queries</a:t>
             </a:r>
           </a:p>
           <a:p>
@@ -3120,168 +3032,175 @@
             <a:endParaRPr lang="en-US" sz="1200" b="0" i="0" dirty="0"/>
           </a:p>
           <a:p>
-            <a:pPr marL="171450" marR="0" lvl="0" indent="-171450" algn="l" defTabSz="914400" rtl="0" eaLnBrk="1" fontAlgn="auto" latinLnBrk="0" hangingPunct="1">
-              <a:lnSpc>
-                <a:spcPct val="100000"/>
-              </a:lnSpc>
-              <a:spcBef>
-                <a:spcPts val="0"/>
-              </a:spcBef>
-              <a:spcAft>
-                <a:spcPts val="0"/>
-              </a:spcAft>
-              <a:buClrTx/>
-              <a:buSzTx/>
+            <a:pPr marL="171450" indent="-171450">
               <a:buFont typeface="Arial" panose="020B0604020202020204" pitchFamily="34" charset="0"/>
               <a:buChar char="•"/>
-              <a:tabLst/>
-              <a:defRPr/>
             </a:pPr>
             <a:r>
-              <a:rPr lang="en-US" sz="1200" b="0" kern="1200" dirty="0">
+              <a:rPr lang="en-US" b="0" dirty="0">
                 <a:solidFill>
-                  <a:schemeClr val="tx1"/>
+                  <a:srgbClr val="D4D4D4"/>
                 </a:solidFill>
                 <a:effectLst/>
-                <a:latin typeface="+mn-lt"/>
-                <a:ea typeface="+mn-ea"/>
-                <a:cs typeface="+mn-cs"/>
-              </a:rPr>
-              <a:t>PostgreSQL provides several options for creating high availability for a server or database.</a:t>
-            </a:r>
-            <a:r>
-              <a:rPr lang="en-US" sz="1200" b="0" i="0" kern="1200" dirty="0">
+                <a:latin typeface="Consolas" panose="020B0609020204030204" pitchFamily="49" charset="0"/>
+              </a:rPr>
+              <a:t>PostgreSQL provides several options for creating high availability for a server or database. High-availability options in Azure include the following:</a:t>
+            </a:r>
+          </a:p>
+          <a:p>
+            <a:pPr marL="628650" lvl="1" indent="-171450">
+              <a:buFont typeface="Arial" panose="020B0604020202020204" pitchFamily="34" charset="0"/>
+              <a:buChar char="•"/>
+            </a:pPr>
+            <a:r>
+              <a:rPr lang="en-US" b="0" dirty="0">
                 <a:solidFill>
-                  <a:schemeClr val="tx1"/>
+                  <a:srgbClr val="D4D4D4"/>
                 </a:solidFill>
                 <a:effectLst/>
-                <a:latin typeface="+mn-lt"/>
-                <a:ea typeface="+mn-ea"/>
-                <a:cs typeface="+mn-cs"/>
-              </a:rPr>
-              <a:t> </a:t>
-            </a:r>
-            <a:r>
-              <a:rPr lang="en-US" sz="1200" b="0" i="0" dirty="0"/>
-              <a:t>High-availability options include the following:</a:t>
-            </a:r>
-          </a:p>
-          <a:p>
-            <a:pPr marL="628650" marR="0" lvl="1" indent="-171450" algn="l" defTabSz="914400" rtl="0" eaLnBrk="1" fontAlgn="auto" latinLnBrk="0" hangingPunct="1">
-              <a:lnSpc>
-                <a:spcPct val="100000"/>
-              </a:lnSpc>
-              <a:spcBef>
-                <a:spcPts val="0"/>
-              </a:spcBef>
-              <a:spcAft>
-                <a:spcPts val="0"/>
-              </a:spcAft>
-              <a:buClrTx/>
-              <a:buSzTx/>
+                <a:latin typeface="Consolas" panose="020B0609020204030204" pitchFamily="49" charset="0"/>
+              </a:rPr>
+              <a:t>Replication options</a:t>
+            </a:r>
+          </a:p>
+          <a:p>
+            <a:pPr marL="1085850" lvl="2" indent="-171450">
               <a:buFont typeface="Arial" panose="020B0604020202020204" pitchFamily="34" charset="0"/>
               <a:buChar char="•"/>
-              <a:tabLst/>
-              <a:defRPr/>
             </a:pPr>
             <a:r>
-              <a:rPr lang="en-US" sz="1200" b="0" kern="1200" dirty="0">
+              <a:rPr lang="en-US" b="0" dirty="0">
                 <a:solidFill>
-                  <a:schemeClr val="tx1"/>
+                  <a:srgbClr val="D4D4D4"/>
                 </a:solidFill>
                 <a:effectLst/>
-                <a:latin typeface="+mn-lt"/>
-                <a:ea typeface="+mn-ea"/>
-                <a:cs typeface="+mn-cs"/>
-              </a:rPr>
-              <a:t>Hyperscale (Citus) clusters two instances to serve as a single node with automatic failover (no data loss)</a:t>
-            </a:r>
-            <a:endParaRPr lang="en-US" sz="1200" b="0" i="0" kern="1200" dirty="0">
-              <a:solidFill>
-                <a:schemeClr val="tx1"/>
-              </a:solidFill>
-              <a:effectLst/>
-              <a:latin typeface="+mn-lt"/>
-              <a:ea typeface="+mn-ea"/>
-              <a:cs typeface="+mn-cs"/>
-            </a:endParaRPr>
-          </a:p>
-          <a:p>
-            <a:pPr marL="628650" marR="0" lvl="1" indent="-171450" algn="l" defTabSz="914400" rtl="0" eaLnBrk="1" fontAlgn="auto" latinLnBrk="0" hangingPunct="1">
-              <a:lnSpc>
-                <a:spcPct val="100000"/>
-              </a:lnSpc>
-              <a:spcBef>
-                <a:spcPts val="0"/>
-              </a:spcBef>
-              <a:spcAft>
-                <a:spcPts val="0"/>
-              </a:spcAft>
-              <a:buClrTx/>
-              <a:buSzTx/>
+                <a:latin typeface="Consolas" panose="020B0609020204030204" pitchFamily="49" charset="0"/>
+              </a:rPr>
+              <a:t>With Single Server, a configured read-only instance can be promoted to read/write capacity </a:t>
+            </a:r>
+          </a:p>
+          <a:p>
+            <a:pPr marL="628650" lvl="1" indent="-171450">
               <a:buFont typeface="Arial" panose="020B0604020202020204" pitchFamily="34" charset="0"/>
               <a:buChar char="•"/>
-              <a:tabLst/>
-              <a:defRPr/>
             </a:pPr>
             <a:r>
-              <a:rPr lang="en-US" sz="1200" b="0" kern="1200" dirty="0">
+              <a:rPr lang="en-US" b="0" dirty="0">
                 <a:solidFill>
-                  <a:schemeClr val="tx1"/>
+                  <a:srgbClr val="D4D4D4"/>
                 </a:solidFill>
                 <a:effectLst/>
-                <a:latin typeface="+mn-lt"/>
-                <a:ea typeface="+mn-ea"/>
-                <a:cs typeface="+mn-cs"/>
-              </a:rPr>
-              <a:t>Hyperscale (Citus) shards databases, and each shard is stored in multiple locations throughout the cluster</a:t>
-            </a:r>
-            <a:endParaRPr lang="en-US" sz="1200" b="0" i="0" dirty="0"/>
-          </a:p>
-          <a:p>
-            <a:pPr marL="628650" marR="0" lvl="1" indent="-171450" algn="l" defTabSz="914400" rtl="0" eaLnBrk="1" fontAlgn="auto" latinLnBrk="0" hangingPunct="1">
-              <a:lnSpc>
-                <a:spcPct val="100000"/>
-              </a:lnSpc>
-              <a:spcBef>
-                <a:spcPts val="0"/>
-              </a:spcBef>
-              <a:spcAft>
-                <a:spcPts val="0"/>
-              </a:spcAft>
-              <a:buClrTx/>
-              <a:buSzTx/>
+                <a:latin typeface="Consolas" panose="020B0609020204030204" pitchFamily="49" charset="0"/>
+              </a:rPr>
+              <a:t>Hyperscale (</a:t>
+            </a:r>
+            <a:r>
+              <a:rPr lang="en-US" b="0" dirty="0" err="1">
+                <a:solidFill>
+                  <a:srgbClr val="D4D4D4"/>
+                </a:solidFill>
+                <a:effectLst/>
+                <a:latin typeface="Consolas" panose="020B0609020204030204" pitchFamily="49" charset="0"/>
+              </a:rPr>
+              <a:t>Citus</a:t>
+            </a:r>
+            <a:r>
+              <a:rPr lang="en-US" b="0" dirty="0">
+                <a:solidFill>
+                  <a:srgbClr val="D4D4D4"/>
+                </a:solidFill>
+                <a:effectLst/>
+                <a:latin typeface="Consolas" panose="020B0609020204030204" pitchFamily="49" charset="0"/>
+              </a:rPr>
+              <a:t>) also supports HA</a:t>
+            </a:r>
+          </a:p>
+          <a:p>
+            <a:pPr marL="1085850" lvl="2" indent="-171450">
               <a:buFont typeface="Arial" panose="020B0604020202020204" pitchFamily="34" charset="0"/>
               <a:buChar char="•"/>
-              <a:tabLst/>
-              <a:defRPr/>
             </a:pPr>
             <a:r>
-              <a:rPr lang="en-US" sz="1200" b="0" i="0" dirty="0"/>
-              <a:t>Replication options</a:t>
-            </a:r>
-          </a:p>
-          <a:p>
-            <a:pPr marL="628650" marR="0" lvl="1" indent="-171450" algn="l" defTabSz="914400" rtl="0" eaLnBrk="1" fontAlgn="auto" latinLnBrk="0" hangingPunct="1">
-              <a:lnSpc>
-                <a:spcPct val="100000"/>
-              </a:lnSpc>
-              <a:spcBef>
-                <a:spcPts val="0"/>
-              </a:spcBef>
-              <a:spcAft>
-                <a:spcPts val="0"/>
-              </a:spcAft>
-              <a:buClrTx/>
-              <a:buSzTx/>
+              <a:rPr lang="en-US" b="0" dirty="0">
+                <a:solidFill>
+                  <a:srgbClr val="D4D4D4"/>
+                </a:solidFill>
+                <a:effectLst/>
+                <a:latin typeface="Consolas" panose="020B0609020204030204" pitchFamily="49" charset="0"/>
+              </a:rPr>
+              <a:t>Hyperscale (</a:t>
+            </a:r>
+            <a:r>
+              <a:rPr lang="en-US" b="0" dirty="0" err="1">
+                <a:solidFill>
+                  <a:srgbClr val="D4D4D4"/>
+                </a:solidFill>
+                <a:effectLst/>
+                <a:latin typeface="Consolas" panose="020B0609020204030204" pitchFamily="49" charset="0"/>
+              </a:rPr>
+              <a:t>Citus</a:t>
+            </a:r>
+            <a:r>
+              <a:rPr lang="en-US" b="0" dirty="0">
+                <a:solidFill>
+                  <a:srgbClr val="D4D4D4"/>
+                </a:solidFill>
+                <a:effectLst/>
+                <a:latin typeface="Consolas" panose="020B0609020204030204" pitchFamily="49" charset="0"/>
+              </a:rPr>
+              <a:t>) can cluster two instances to serve as a single node with automatic failover (no data loss)</a:t>
+            </a:r>
+          </a:p>
+          <a:p>
+            <a:pPr marL="1085850" lvl="2" indent="-171450">
               <a:buFont typeface="Arial" panose="020B0604020202020204" pitchFamily="34" charset="0"/>
               <a:buChar char="•"/>
-              <a:tabLst/>
-              <a:defRPr/>
             </a:pPr>
             <a:r>
-              <a:rPr lang="en-US" sz="1200" b="0" i="0" dirty="0"/>
-              <a:t>Log shipping</a:t>
+              <a:rPr lang="en-US" b="0" dirty="0">
+                <a:solidFill>
+                  <a:srgbClr val="D4D4D4"/>
+                </a:solidFill>
+                <a:effectLst/>
+                <a:latin typeface="Consolas" panose="020B0609020204030204" pitchFamily="49" charset="0"/>
+              </a:rPr>
+              <a:t>Hyperscale (</a:t>
+            </a:r>
+            <a:r>
+              <a:rPr lang="en-US" b="0" dirty="0" err="1">
+                <a:solidFill>
+                  <a:srgbClr val="D4D4D4"/>
+                </a:solidFill>
+                <a:effectLst/>
+                <a:latin typeface="Consolas" panose="020B0609020204030204" pitchFamily="49" charset="0"/>
+              </a:rPr>
+              <a:t>Citus</a:t>
+            </a:r>
+            <a:r>
+              <a:rPr lang="en-US" b="0" dirty="0">
+                <a:solidFill>
+                  <a:srgbClr val="D4D4D4"/>
+                </a:solidFill>
+                <a:effectLst/>
+                <a:latin typeface="Consolas" panose="020B0609020204030204" pitchFamily="49" charset="0"/>
+              </a:rPr>
+              <a:t>) shards databases, and each shard is stored in multiple locations throughout the cluster</a:t>
+            </a:r>
+          </a:p>
+          <a:p>
+            <a:pPr marL="628650" lvl="1" indent="-171450">
+              <a:buFont typeface="Arial" panose="020B0604020202020204" pitchFamily="34" charset="0"/>
+              <a:buChar char="•"/>
+            </a:pPr>
+            <a:r>
+              <a:rPr lang="en-US" b="0" dirty="0">
+                <a:solidFill>
+                  <a:srgbClr val="D4D4D4"/>
+                </a:solidFill>
+                <a:effectLst/>
+                <a:latin typeface="Consolas" panose="020B0609020204030204" pitchFamily="49" charset="0"/>
+              </a:rPr>
+              <a:t>Log shipping</a:t>
             </a:r>
           </a:p>
         </p:txBody>
@@ -3424,6 +3343,46 @@
               <a:buChar char="•"/>
             </a:pPr>
             <a:r>
+              <a:rPr lang="en-US" b="0" kern="1200" dirty="0">
+                <a:solidFill>
+                  <a:schemeClr val="tx1"/>
+                </a:solidFill>
+                <a:effectLst/>
+                <a:latin typeface="+mn-lt"/>
+                <a:ea typeface="+mn-ea"/>
+                <a:cs typeface="+mn-cs"/>
+              </a:rPr>
+              <a:t>However, </a:t>
+            </a:r>
+            <a:r>
+              <a:rPr lang="en-US" b="0" kern="1200" dirty="0">
+                <a:solidFill>
+                  <a:srgbClr val="D4D4D4"/>
+                </a:solidFill>
+                <a:effectLst/>
+                <a:latin typeface="Consolas" panose="020B0609020204030204" pitchFamily="49" charset="0"/>
+                <a:ea typeface="+mn-ea"/>
+                <a:cs typeface="+mn-cs"/>
+              </a:rPr>
+              <a:t>i</a:t>
+            </a:r>
+            <a:r>
+              <a:rPr lang="en-US" b="0" dirty="0">
+                <a:solidFill>
+                  <a:srgbClr val="D4D4D4"/>
+                </a:solidFill>
+                <a:effectLst/>
+                <a:latin typeface="Consolas" panose="020B0609020204030204" pitchFamily="49" charset="0"/>
+              </a:rPr>
+              <a:t>mplementing the high availability and performance features of an Azure offering locally would be significantly more difficult than using Azure's managed service</a:t>
+            </a:r>
+          </a:p>
+          <a:p>
+            <a:pPr marL="171450" indent="-171450">
+              <a:buFont typeface="Arial" panose="020B0604020202020204" pitchFamily="34" charset="0"/>
+              <a:buChar char="•"/>
+            </a:pPr>
+            <a:r>
               <a:rPr lang="en-US" sz="1200" kern="1200" dirty="0">
                 <a:solidFill>
                   <a:schemeClr val="tx1"/>
@@ -3433,7 +3392,7 @@
                 <a:ea typeface="+mn-ea"/>
                 <a:cs typeface="+mn-cs"/>
               </a:rPr>
-              <a:t>If we do, we might consider using the high availability and performance features of a Hyperscale (Citus) cluster</a:t>
+              <a:t>Other on-premises applications might keep them on-premises until they can figure out how to move those applications to the cloud </a:t>
             </a:r>
           </a:p>
           <a:p>
@@ -3451,14 +3410,13 @@
                 <a:ea typeface="+mn-ea"/>
                 <a:cs typeface="+mn-cs"/>
               </a:rPr>
-              <a:t>Other on-premises applications might keep them on-premises until they can figure out how to move those applications to the cloud </a:t>
-            </a:r>
-          </a:p>
-          <a:p>
-            <a:pPr marL="171450" indent="-171450">
-              <a:buFont typeface="Arial" panose="020B0604020202020204" pitchFamily="34" charset="0"/>
-              <a:buChar char="•"/>
-            </a:pPr>
+              <a:t>It depends on the integration touchpoints, network latency needs, and reliable internet connectivity for all offices</a:t>
+            </a:r>
+            <a:endParaRPr lang="en-US" dirty="0">
+              <a:effectLst/>
+            </a:endParaRPr>
+          </a:p>
+          <a:p>
             <a:r>
               <a:rPr lang="en-US" sz="1200" kern="1200" dirty="0">
                 <a:solidFill>
@@ -3469,13 +3427,52 @@
                 <a:ea typeface="+mn-ea"/>
                 <a:cs typeface="+mn-cs"/>
               </a:rPr>
-              <a:t>It depends on the integration touchpoints, network latency needs, and reliable internet connectivity for all offices</a:t>
+              <a:t> </a:t>
             </a:r>
             <a:endParaRPr lang="en-US" dirty="0">
               <a:effectLst/>
             </a:endParaRPr>
           </a:p>
           <a:p>
+            <a:pPr lvl="0"/>
+            <a:r>
+              <a:rPr lang="en-US" sz="1200" b="1" i="1" kern="1200" dirty="0">
+                <a:solidFill>
+                  <a:schemeClr val="tx1"/>
+                </a:solidFill>
+                <a:effectLst/>
+                <a:latin typeface="+mn-lt"/>
+                <a:ea typeface="+mn-ea"/>
+                <a:cs typeface="+mn-cs"/>
+              </a:rPr>
+              <a:t>Is there any benefit to going straight to Microsoft Azure? Does Azure Database for PostgreSQL take care of all their requirements?</a:t>
+            </a:r>
+            <a:endParaRPr lang="en-US" b="1" dirty="0">
+              <a:effectLst/>
+            </a:endParaRPr>
+          </a:p>
+          <a:p>
+            <a:r>
+              <a:rPr lang="en-US" sz="1200" i="1" kern="1200" dirty="0">
+                <a:solidFill>
+                  <a:schemeClr val="tx1"/>
+                </a:solidFill>
+                <a:effectLst/>
+                <a:latin typeface="+mn-lt"/>
+                <a:ea typeface="+mn-ea"/>
+                <a:cs typeface="+mn-cs"/>
+              </a:rPr>
+              <a:t> </a:t>
+            </a:r>
+            <a:endParaRPr lang="en-US" dirty="0">
+              <a:effectLst/>
+            </a:endParaRPr>
+          </a:p>
+          <a:p>
+            <a:pPr marL="171450" indent="-171450">
+              <a:buFont typeface="Arial" panose="020B0604020202020204" pitchFamily="34" charset="0"/>
+              <a:buChar char="•"/>
+            </a:pPr>
             <a:r>
               <a:rPr lang="en-US" sz="1200" kern="1200" dirty="0">
                 <a:solidFill>
@@ -3486,46 +3483,8 @@
                 <a:ea typeface="+mn-ea"/>
                 <a:cs typeface="+mn-cs"/>
               </a:rPr>
-              <a:t> </a:t>
-            </a:r>
-            <a:endParaRPr lang="en-US" dirty="0">
-              <a:effectLst/>
-            </a:endParaRPr>
-          </a:p>
-          <a:p>
-            <a:pPr lvl="0"/>
-            <a:r>
-              <a:rPr lang="en-US" sz="1200" b="1" i="1" kern="1200" dirty="0">
-                <a:solidFill>
-                  <a:schemeClr val="tx1"/>
-                </a:solidFill>
-                <a:effectLst/>
-                <a:latin typeface="+mn-lt"/>
-                <a:ea typeface="+mn-ea"/>
-                <a:cs typeface="+mn-cs"/>
-              </a:rPr>
-              <a:t>Is there any benefit to going straight to Microsoft Azure? Does Azure Database for PostgreSQL take care of all their requirements?</a:t>
-            </a:r>
-            <a:endParaRPr lang="en-US" b="1" dirty="0">
-              <a:effectLst/>
-            </a:endParaRPr>
-          </a:p>
-          <a:p>
-            <a:r>
-              <a:rPr lang="en-US" sz="1200" i="1" kern="1200" dirty="0">
-                <a:solidFill>
-                  <a:schemeClr val="tx1"/>
-                </a:solidFill>
-                <a:effectLst/>
-                <a:latin typeface="+mn-lt"/>
-                <a:ea typeface="+mn-ea"/>
-                <a:cs typeface="+mn-cs"/>
-              </a:rPr>
-              <a:t> </a:t>
-            </a:r>
-            <a:endParaRPr lang="en-US" dirty="0">
-              <a:effectLst/>
-            </a:endParaRPr>
+              <a:t>If the organization has chosen to go to the cloud, this might be a long-term cost savings of skipping purchasing the on-premises hardware</a:t>
+            </a:r>
           </a:p>
           <a:p>
             <a:pPr marL="171450" indent="-171450">
@@ -3533,16 +3492,10 @@
               <a:buChar char="•"/>
             </a:pPr>
             <a:r>
-              <a:rPr lang="en-US" sz="1200" kern="1200" dirty="0">
-                <a:solidFill>
-                  <a:schemeClr val="tx1"/>
-                </a:solidFill>
+              <a:rPr lang="en-US" dirty="0">
                 <a:effectLst/>
-                <a:latin typeface="+mn-lt"/>
-                <a:ea typeface="+mn-ea"/>
-                <a:cs typeface="+mn-cs"/>
-              </a:rPr>
-              <a:t>If the organization has chosen to go to the cloud, this might be a long-term cost savings of skipping purchasing the on-premises hardware</a:t>
+              </a:rPr>
+              <a:t>If the applications are already cloud-based, or they have many external applications needing access, then this would not affect latency while removing the burden from WWI of maintaining the connectivity with all their integration partners</a:t>
             </a:r>
           </a:p>
           <a:p>
@@ -3554,19 +3507,7 @@
               <a:rPr lang="en-US" dirty="0">
                 <a:effectLst/>
               </a:rPr>
-              <a:t>If the applications are already cloud-based, or they have many external applications needing access, then this would not affect latency while removing the burden from WWI of maintaining the connectivity with all their integration partners</a:t>
-            </a:r>
-          </a:p>
-          <a:p>
-            <a:pPr marL="171450" indent="-171450">
-              <a:buFont typeface="Arial" panose="020B0604020202020204" pitchFamily="34" charset="0"/>
-              <a:buChar char="•"/>
-            </a:pPr>
-            <a:r>
-              <a:rPr lang="en-US" dirty="0">
-                <a:effectLst/>
-              </a:rPr>
-              <a:t>In addition, they would gain the benefit of simplifying future software upgrades so the current investment in new hardware was necessary. Some of their products would upgrade and offer new features with minimal effort on their part</a:t>
+              <a:t>In addition, they would gain the benefit of simplifying future software upgrades. Some of their products would upgrade and offer new features with minimal effort on their part</a:t>
             </a:r>
           </a:p>
           <a:p>
@@ -3943,7 +3884,7 @@
             </a:pPr>
             <a:r>
               <a:rPr lang="en-US" b="0" i="0" dirty="0"/>
-              <a:t>The online sales application and the web services would migrate to Azure Websites </a:t>
+              <a:t>The online sales application and the web services would migrate to Azure App Service </a:t>
             </a:r>
           </a:p>
           <a:p>
@@ -4035,7 +3976,7 @@
             </a:pPr>
             <a:r>
               <a:rPr lang="en-US" b="0" i="0" dirty="0"/>
-              <a:t>Use Entity Framework if appropriate to make the CRUD migration easier</a:t>
+              <a:t>Use Entity Framework (Core) if appropriate to make the CRUD migration easier</a:t>
             </a:r>
           </a:p>
           <a:p>
@@ -4045,7 +3986,7 @@
             </a:pPr>
             <a:r>
               <a:rPr lang="en-US" b="0" i="0" dirty="0"/>
-              <a:t>Use of Entity Framework, or another ORM, in the existing applications and services will make migration easier</a:t>
+              <a:t>Use of Entity Framework (Core), or another ORM, in the existing applications and services will make migration easier</a:t>
             </a:r>
           </a:p>
           <a:p>
@@ -4065,7 +4006,7 @@
             </a:pPr>
             <a:r>
               <a:rPr lang="en-US" b="0" i="0" dirty="0"/>
-              <a:t>Blockers might be if Entity Framework is using Stored Procedures in Oracle. Those will need to be tested after we run ora2pg to migrate them</a:t>
+              <a:t>Blockers might be if Entity Framework is using Stored Procedures in Oracle. Those will need to be tested after we run ora2pg to migrate them. PostgreSQL 11 supports stored procedures, though functions may be preferable if the contained logic returns a result set</a:t>
             </a:r>
           </a:p>
           <a:p>
@@ -4380,7 +4321,7 @@
                 <a:ea typeface="+mn-ea"/>
                 <a:cs typeface="+mn-cs"/>
               </a:rPr>
-              <a:t>Power BI is compatible with JSON data, allowing the creation of reports to view bad data that didn’t parse</a:t>
+              <a:t>Power BI is compatible with JSON data, allowing the creation of reports to view data that didn’t parse</a:t>
             </a:r>
           </a:p>
           <a:p>
@@ -4584,6 +4525,92 @@
                 <a:cs typeface="+mn-cs"/>
               </a:rPr>
               <a:t>zure Database for PostgreSQL - Hyperscale (Citus) is simpler to provision and manage, and offers excellent performance</a:t>
+            </a:r>
+          </a:p>
+          <a:p>
+            <a:pPr marL="628650" marR="0" lvl="1" indent="-171450" algn="l" defTabSz="914400" rtl="0" eaLnBrk="1" fontAlgn="auto" latinLnBrk="0" hangingPunct="1">
+              <a:lnSpc>
+                <a:spcPct val="100000"/>
+              </a:lnSpc>
+              <a:spcBef>
+                <a:spcPts val="0"/>
+              </a:spcBef>
+              <a:spcAft>
+                <a:spcPts val="0"/>
+              </a:spcAft>
+              <a:buClrTx/>
+              <a:buSzTx/>
+              <a:buFont typeface="Arial" panose="020B0604020202020204" pitchFamily="34" charset="0"/>
+              <a:buChar char="•"/>
+              <a:tabLst/>
+              <a:defRPr/>
+            </a:pPr>
+            <a:r>
+              <a:rPr lang="en-US" sz="1200" b="0" kern="1200" dirty="0">
+                <a:solidFill>
+                  <a:schemeClr val="tx1"/>
+                </a:solidFill>
+                <a:effectLst/>
+                <a:latin typeface="+mn-lt"/>
+                <a:ea typeface="+mn-ea"/>
+                <a:cs typeface="+mn-cs"/>
+              </a:rPr>
+              <a:t>Hyperscale (</a:t>
+            </a:r>
+            <a:r>
+              <a:rPr lang="en-US" sz="1200" b="0" kern="1200" dirty="0" err="1">
+                <a:solidFill>
+                  <a:schemeClr val="tx1"/>
+                </a:solidFill>
+                <a:effectLst/>
+                <a:latin typeface="+mn-lt"/>
+                <a:ea typeface="+mn-ea"/>
+                <a:cs typeface="+mn-cs"/>
+              </a:rPr>
+              <a:t>Citus</a:t>
+            </a:r>
+            <a:r>
+              <a:rPr lang="en-US" sz="1200" b="0" kern="1200" dirty="0">
+                <a:solidFill>
+                  <a:schemeClr val="tx1"/>
+                </a:solidFill>
+                <a:effectLst/>
+                <a:latin typeface="+mn-lt"/>
+                <a:ea typeface="+mn-ea"/>
+                <a:cs typeface="+mn-cs"/>
+              </a:rPr>
+              <a:t>) is well-suited to large workloads (100 GB+), like large multi-tenant apps</a:t>
+            </a:r>
+          </a:p>
+          <a:p>
+            <a:pPr marL="628650" marR="0" lvl="1" indent="-171450" algn="l" defTabSz="914400" rtl="0" eaLnBrk="1" fontAlgn="auto" latinLnBrk="0" hangingPunct="1">
+              <a:lnSpc>
+                <a:spcPct val="100000"/>
+              </a:lnSpc>
+              <a:spcBef>
+                <a:spcPts val="0"/>
+              </a:spcBef>
+              <a:spcAft>
+                <a:spcPts val="0"/>
+              </a:spcAft>
+              <a:buClrTx/>
+              <a:buSzTx/>
+              <a:buFont typeface="Arial" panose="020B0604020202020204" pitchFamily="34" charset="0"/>
+              <a:buChar char="•"/>
+              <a:tabLst/>
+              <a:defRPr/>
+            </a:pPr>
+            <a:r>
+              <a:rPr lang="en-US" sz="1200" b="0" kern="1200" dirty="0">
+                <a:solidFill>
+                  <a:schemeClr val="tx1"/>
+                </a:solidFill>
+                <a:effectLst/>
+                <a:latin typeface="+mn-lt"/>
+                <a:ea typeface="+mn-ea"/>
+                <a:cs typeface="+mn-cs"/>
+              </a:rPr>
+              <a:t>Enhanced features (PostgreSQL 13 support, compressed columnar storage, and more)</a:t>
             </a:r>
           </a:p>
           <a:p>
@@ -4727,8 +4754,13 @@
             </a:pPr>
             <a:r>
               <a:rPr lang="en-US" b="0" i="0" dirty="0"/>
-              <a:t>Developers can connect to Azure Database for PostgreSQL from Power BI desktop through DirectQuery, but when reports are deployed to Power BI Service (for web-based reporting), data must be imported into the model</a:t>
-            </a:r>
+              <a:t>Developers can connect to Azure Database for PostgreSQL from Power BI Desktop and Service through </a:t>
+            </a:r>
+            <a:r>
+              <a:rPr lang="en-US" b="0" i="0" dirty="0" err="1"/>
+              <a:t>DirectQuery</a:t>
+            </a:r>
+            <a:endParaRPr lang="en-US" b="0" i="0" dirty="0"/>
           </a:p>
         </p:txBody>
       </p:sp>
@@ -4959,7 +4991,7 @@
                   <a:prstClr val="black"/>
                 </a:solidFill>
               </a:rPr>
-              <a:t>8/6/2020 3:53 PM</a:t>
+              <a:t>8/19/2021 3:25 PM</a:t>
             </a:fld>
             <a:endParaRPr lang="en-US" dirty="0">
               <a:solidFill>
@@ -5508,7 +5540,7 @@
                 <a:latin typeface="+mn-lt"/>
                 <a:cs typeface="Segoe UI" panose="020B0502040204020203" pitchFamily="34" charset="0"/>
               </a:rPr>
-              <a:t>The database is used by an online store application, written in ASP.NET MVC</a:t>
+              <a:t>The database is used by an online store application, written in ASP.NET Core MVC</a:t>
             </a:r>
           </a:p>
           <a:p>
@@ -20340,10 +20372,10 @@
       </p:sp>
       <p:pic>
         <p:nvPicPr>
-          <p:cNvPr id="4" name="Picture 3" descr="The network diagram displays the applications and the connections to the Azure Cloud servicecs.">
+          <p:cNvPr id="5" name="Picture 4" descr="Graphical user interface&#10;&#10;Description automatically generated">
             <a:extLst>
               <a:ext uri="{FF2B5EF4-FFF2-40B4-BE49-F238E27FC236}">
-                <a16:creationId xmlns:a16="http://schemas.microsoft.com/office/drawing/2014/main" id="{E36BF91D-FD1D-42D4-8903-E02650654540}"/>
+                <a16:creationId xmlns:a16="http://schemas.microsoft.com/office/drawing/2014/main" id="{55D70810-7A08-4613-AF4F-F5FAFBB23AA9}"/>
               </a:ext>
             </a:extLst>
           </p:cNvPr>
@@ -20353,21 +20385,15 @@
           <p:nvPr/>
         </p:nvPicPr>
         <p:blipFill>
-          <a:blip r:embed="rId3">
-            <a:extLst>
-              <a:ext uri="{28A0092B-C50C-407E-A947-70E740481C1C}">
-                <a14:useLocalDpi xmlns:a14="http://schemas.microsoft.com/office/drawing/2010/main" val="0"/>
-              </a:ext>
-            </a:extLst>
-          </a:blip>
+          <a:blip r:embed="rId3"/>
           <a:stretch>
             <a:fillRect/>
           </a:stretch>
         </p:blipFill>
         <p:spPr>
           <a:xfrm>
-            <a:off x="960474" y="1189176"/>
-            <a:ext cx="10271051" cy="5363248"/>
+            <a:off x="1136276" y="1189176"/>
+            <a:ext cx="9919447" cy="5179650"/>
           </a:xfrm>
           <a:prstGeom prst="rect">
             <a:avLst/>
@@ -20483,10 +20509,10 @@
       </p:sp>
       <p:pic>
         <p:nvPicPr>
-          <p:cNvPr id="5" name="Picture 4" descr="Shows the migration path from Oracle to Azure Database for PostgreSQL">
+          <p:cNvPr id="4" name="Picture 3" descr="Graphical user interface&#10;&#10;Description automatically generated with medium confidence">
             <a:extLst>
               <a:ext uri="{FF2B5EF4-FFF2-40B4-BE49-F238E27FC236}">
-                <a16:creationId xmlns:a16="http://schemas.microsoft.com/office/drawing/2014/main" id="{01069F01-853A-4149-9985-62644DCA32E4}"/>
+                <a16:creationId xmlns:a16="http://schemas.microsoft.com/office/drawing/2014/main" id="{EB84BDE3-7DE6-4F0A-8979-90FDD3A37726}"/>
               </a:ext>
             </a:extLst>
           </p:cNvPr>
@@ -20496,21 +20522,15 @@
           <p:nvPr/>
         </p:nvPicPr>
         <p:blipFill>
-          <a:blip r:embed="rId3">
-            <a:extLst>
-              <a:ext uri="{28A0092B-C50C-407E-A947-70E740481C1C}">
-                <a14:useLocalDpi xmlns:a14="http://schemas.microsoft.com/office/drawing/2010/main" val="0"/>
-              </a:ext>
-            </a:extLst>
-          </a:blip>
+          <a:blip r:embed="rId3"/>
           <a:stretch>
             <a:fillRect/>
           </a:stretch>
         </p:blipFill>
         <p:spPr>
           <a:xfrm>
-            <a:off x="514817" y="2434390"/>
-            <a:ext cx="11162366" cy="3234433"/>
+            <a:off x="722835" y="2135009"/>
+            <a:ext cx="10746330" cy="3113882"/>
           </a:xfrm>
           <a:prstGeom prst="rect">
             <a:avLst/>
@@ -21125,7 +21145,7 @@
                 <a:latin typeface="Segoe UI Semilight" panose="020B0402040204020203" pitchFamily="34" charset="0"/>
                 <a:cs typeface="Segoe UI Semilight" panose="020B0402040204020203" pitchFamily="34" charset="0"/>
               </a:rPr>
-              <a:t>In this whiteboard design session, you work with a group to design a proof of concept (POC) for conducting a site analysis for a customer to compare cost, performance, and level of effort required to migrate from Oracle to Azure Database for PostgreSQL. You evaluate the dependent applications and reports that need to be updated and come up with a migration plan. Also, you review ways to help the customer take advantage of new PostgreSQL features to improve performance and resiliency and consider the impact of migrating from on-premises to the cloud.</a:t>
+              <a:t>In this whiteboard design session, you work with a group to design a proof of concept (POC) for conducting a site analysis for a customer to compare cost, performance, and level of effort required to migrate from Oracle to Azure Database for PostgreSQL. You evaluate the dependent applications and reports that need to be updated and produce a migration plan. Also, you review ways to help the customer take advantage of new PostgreSQL features to improve performance and resiliency and consider the impact of migrating from on-premises to the cloud.</a:t>
             </a:r>
           </a:p>
           <a:p>
@@ -21290,10 +21310,10 @@
       </p:sp>
       <p:pic>
         <p:nvPicPr>
-          <p:cNvPr id="5" name="Picture 4" descr="The picture shows the log data moving from PostgreSQL to Azure Monitor.">
+          <p:cNvPr id="6" name="Picture 5" descr="Graphical user interface&#10;&#10;Description automatically generated with medium confidence">
             <a:extLst>
               <a:ext uri="{FF2B5EF4-FFF2-40B4-BE49-F238E27FC236}">
-                <a16:creationId xmlns:a16="http://schemas.microsoft.com/office/drawing/2014/main" id="{3D15D6FB-A2F1-4859-8BA6-3980BD7FBD58}"/>
+                <a16:creationId xmlns:a16="http://schemas.microsoft.com/office/drawing/2014/main" id="{CA8F016B-8ABF-4EC7-B0B4-7C98B6F0E019}"/>
               </a:ext>
             </a:extLst>
           </p:cNvPr>
@@ -21310,8 +21330,8 @@
         </p:blipFill>
         <p:spPr>
           <a:xfrm>
-            <a:off x="773190" y="2088842"/>
-            <a:ext cx="10645620" cy="3659048"/>
+            <a:off x="2051547" y="2088842"/>
+            <a:ext cx="8088906" cy="3541552"/>
           </a:xfrm>
           <a:prstGeom prst="rect">
             <a:avLst/>

</xml_diff>